<commit_message>
JS Aula 10, 1a Prova JS, Design Aula04
</commit_message>
<xml_diff>
--- a/Module07-Design/Aula01/Aula01-resumo-vídeos.pptx
+++ b/Module07-Design/Aula01/Aula01-resumo-vídeos.pptx
@@ -118,6 +118,11 @@
       </a:defRPr>
     </a:lvl9pPr>
   </p:defaultTextStyle>
+  <p:extLst>
+    <p:ext uri="{EFAFB233-063F-42B5-8137-9DF3F51BA10A}">
+      <p15:sldGuideLst xmlns:p15="http://schemas.microsoft.com/office/powerpoint/2012/main"/>
+    </p:ext>
+  </p:extLst>
 </p:presentation>
 </file>
 
@@ -260,7 +265,7 @@
           <a:p>
             <a:fld id="{88D371E4-0CFF-4188-8CFA-5EBB6E6DC511}" type="datetimeFigureOut">
               <a:rPr lang="pt-BR" smtClean="0"/>
-              <a:t>08/11/2022</a:t>
+              <a:t>12/11/2022</a:t>
             </a:fld>
             <a:endParaRPr lang="pt-BR"/>
           </a:p>
@@ -471,7 +476,7 @@
           <a:p>
             <a:fld id="{88D371E4-0CFF-4188-8CFA-5EBB6E6DC511}" type="datetimeFigureOut">
               <a:rPr lang="pt-BR" smtClean="0"/>
-              <a:t>08/11/2022</a:t>
+              <a:t>12/11/2022</a:t>
             </a:fld>
             <a:endParaRPr lang="pt-BR"/>
           </a:p>
@@ -686,7 +691,7 @@
           <a:p>
             <a:fld id="{88D371E4-0CFF-4188-8CFA-5EBB6E6DC511}" type="datetimeFigureOut">
               <a:rPr lang="pt-BR" smtClean="0"/>
-              <a:t>08/11/2022</a:t>
+              <a:t>12/11/2022</a:t>
             </a:fld>
             <a:endParaRPr lang="pt-BR"/>
           </a:p>
@@ -887,7 +892,7 @@
           <a:p>
             <a:fld id="{88D371E4-0CFF-4188-8CFA-5EBB6E6DC511}" type="datetimeFigureOut">
               <a:rPr lang="pt-BR" smtClean="0"/>
-              <a:t>08/11/2022</a:t>
+              <a:t>12/11/2022</a:t>
             </a:fld>
             <a:endParaRPr lang="pt-BR"/>
           </a:p>
@@ -1166,7 +1171,7 @@
           <a:p>
             <a:fld id="{88D371E4-0CFF-4188-8CFA-5EBB6E6DC511}" type="datetimeFigureOut">
               <a:rPr lang="pt-BR" smtClean="0"/>
-              <a:t>08/11/2022</a:t>
+              <a:t>12/11/2022</a:t>
             </a:fld>
             <a:endParaRPr lang="pt-BR"/>
           </a:p>
@@ -1434,7 +1439,7 @@
           <a:p>
             <a:fld id="{88D371E4-0CFF-4188-8CFA-5EBB6E6DC511}" type="datetimeFigureOut">
               <a:rPr lang="pt-BR" smtClean="0"/>
-              <a:t>08/11/2022</a:t>
+              <a:t>12/11/2022</a:t>
             </a:fld>
             <a:endParaRPr lang="pt-BR"/>
           </a:p>
@@ -1850,7 +1855,7 @@
           <a:p>
             <a:fld id="{88D371E4-0CFF-4188-8CFA-5EBB6E6DC511}" type="datetimeFigureOut">
               <a:rPr lang="pt-BR" smtClean="0"/>
-              <a:t>08/11/2022</a:t>
+              <a:t>12/11/2022</a:t>
             </a:fld>
             <a:endParaRPr lang="pt-BR"/>
           </a:p>
@@ -1999,7 +2004,7 @@
           <a:p>
             <a:fld id="{88D371E4-0CFF-4188-8CFA-5EBB6E6DC511}" type="datetimeFigureOut">
               <a:rPr lang="pt-BR" smtClean="0"/>
-              <a:t>08/11/2022</a:t>
+              <a:t>12/11/2022</a:t>
             </a:fld>
             <a:endParaRPr lang="pt-BR"/>
           </a:p>
@@ -2125,7 +2130,7 @@
           <a:p>
             <a:fld id="{88D371E4-0CFF-4188-8CFA-5EBB6E6DC511}" type="datetimeFigureOut">
               <a:rPr lang="pt-BR" smtClean="0"/>
-              <a:t>08/11/2022</a:t>
+              <a:t>12/11/2022</a:t>
             </a:fld>
             <a:endParaRPr lang="pt-BR"/>
           </a:p>
@@ -2376,7 +2381,7 @@
           <a:p>
             <a:fld id="{88D371E4-0CFF-4188-8CFA-5EBB6E6DC511}" type="datetimeFigureOut">
               <a:rPr lang="pt-BR" smtClean="0"/>
-              <a:t>08/11/2022</a:t>
+              <a:t>12/11/2022</a:t>
             </a:fld>
             <a:endParaRPr lang="pt-BR"/>
           </a:p>
@@ -2821,7 +2826,7 @@
           <a:p>
             <a:fld id="{88D371E4-0CFF-4188-8CFA-5EBB6E6DC511}" type="datetimeFigureOut">
               <a:rPr lang="pt-BR" smtClean="0"/>
-              <a:t>08/11/2022</a:t>
+              <a:t>12/11/2022</a:t>
             </a:fld>
             <a:endParaRPr lang="pt-BR"/>
           </a:p>
@@ -3147,7 +3152,7 @@
           <a:p>
             <a:fld id="{88D371E4-0CFF-4188-8CFA-5EBB6E6DC511}" type="datetimeFigureOut">
               <a:rPr lang="pt-BR" smtClean="0"/>
-              <a:t>08/11/2022</a:t>
+              <a:t>12/11/2022</a:t>
             </a:fld>
             <a:endParaRPr lang="pt-BR"/>
           </a:p>
@@ -3817,7 +3822,7 @@
           <a:p>
             <a:r>
               <a:rPr lang="pt-BR" dirty="0" err="1"/>
-              <a:t>photon</a:t>
+              <a:t>Photon</a:t>
             </a:r>
             <a:r>
               <a:rPr lang="pt-BR" dirty="0"/>
@@ -3835,7 +3840,7 @@
           <a:p>
             <a:r>
               <a:rPr lang="pt-BR" dirty="0" err="1"/>
-              <a:t>work</a:t>
+              <a:t>Work</a:t>
             </a:r>
             <a:r>
               <a:rPr lang="pt-BR" dirty="0"/>
@@ -3858,7 +3863,7 @@
           <a:p>
             <a:r>
               <a:rPr lang="pt-BR" dirty="0"/>
-              <a:t>light UI </a:t>
+              <a:t>Light UI </a:t>
             </a:r>
             <a:r>
               <a:rPr lang="pt-BR" dirty="0" err="1"/>
@@ -3880,7 +3885,7 @@
           <a:p>
             <a:r>
               <a:rPr lang="pt-BR" dirty="0" err="1"/>
-              <a:t>unified</a:t>
+              <a:t>Unified</a:t>
             </a:r>
             <a:r>
               <a:rPr lang="pt-BR" dirty="0"/>
@@ -4007,7 +4012,7 @@
           <a:p>
             <a:r>
               <a:rPr lang="pt-BR" dirty="0" err="1"/>
-              <a:t>change</a:t>
+              <a:t>Change</a:t>
             </a:r>
             <a:r>
               <a:rPr lang="pt-BR" dirty="0"/>
@@ -4030,7 +4035,7 @@
           <a:p>
             <a:r>
               <a:rPr lang="pt-BR" dirty="0" err="1"/>
-              <a:t>native</a:t>
+              <a:t>Native</a:t>
             </a:r>
             <a:r>
               <a:rPr lang="pt-BR" dirty="0"/>
@@ -4056,7 +4061,7 @@
           <a:p>
             <a:r>
               <a:rPr lang="pt-BR" dirty="0" err="1"/>
-              <a:t>should</a:t>
+              <a:t>Should</a:t>
             </a:r>
             <a:r>
               <a:rPr lang="pt-BR" dirty="0"/>
@@ -4111,7 +4116,7 @@
           <a:p>
             <a:r>
               <a:rPr lang="pt-BR" dirty="0" err="1"/>
-              <a:t>keep</a:t>
+              <a:t>Keep</a:t>
             </a:r>
             <a:r>
               <a:rPr lang="pt-BR" dirty="0"/>
@@ -4129,6 +4134,37 @@
           <a:p>
             <a:r>
               <a:rPr lang="pt-BR" dirty="0" err="1"/>
+              <a:t>Presentation</a:t>
+            </a:r>
+            <a:endParaRPr lang="pt-BR" dirty="0"/>
+          </a:p>
+          <a:p>
+            <a:r>
+              <a:rPr lang="pt-BR" dirty="0" err="1"/>
+              <a:t>Idia</a:t>
+            </a:r>
+            <a:r>
+              <a:rPr lang="pt-BR" dirty="0"/>
+              <a:t>, </a:t>
+            </a:r>
+            <a:r>
+              <a:rPr lang="pt-BR" dirty="0" err="1"/>
+              <a:t>criativity</a:t>
+            </a:r>
+            <a:r>
+              <a:rPr lang="pt-BR" dirty="0"/>
+              <a:t> </a:t>
+            </a:r>
+            <a:r>
+              <a:rPr lang="pt-BR" dirty="0" err="1"/>
+              <a:t>and</a:t>
+            </a:r>
+            <a:r>
+              <a:rPr lang="pt-BR" dirty="0"/>
+              <a:t> </a:t>
+            </a:r>
+            <a:r>
+              <a:rPr lang="pt-BR" dirty="0" err="1"/>
               <a:t>presentation</a:t>
             </a:r>
             <a:endParaRPr lang="pt-BR" dirty="0"/>
@@ -4136,45 +4172,7 @@
           <a:p>
             <a:r>
               <a:rPr lang="pt-BR" dirty="0"/>
-              <a:t>(</a:t>
-            </a:r>
-            <a:r>
-              <a:rPr lang="pt-BR" dirty="0" err="1"/>
-              <a:t>idia</a:t>
-            </a:r>
-            <a:r>
-              <a:rPr lang="pt-BR" dirty="0"/>
-              <a:t>, </a:t>
-            </a:r>
-            <a:r>
-              <a:rPr lang="pt-BR" dirty="0" err="1"/>
-              <a:t>criativity</a:t>
-            </a:r>
-            <a:r>
-              <a:rPr lang="pt-BR" dirty="0"/>
-              <a:t> </a:t>
-            </a:r>
-            <a:r>
-              <a:rPr lang="pt-BR" dirty="0" err="1"/>
-              <a:t>and</a:t>
-            </a:r>
-            <a:r>
-              <a:rPr lang="pt-BR" dirty="0"/>
-              <a:t> </a:t>
-            </a:r>
-            <a:r>
-              <a:rPr lang="pt-BR" dirty="0" err="1"/>
-              <a:t>presentation</a:t>
-            </a:r>
-            <a:r>
-              <a:rPr lang="pt-BR" dirty="0"/>
-              <a:t>)</a:t>
-            </a:r>
-          </a:p>
-          <a:p>
-            <a:r>
-              <a:rPr lang="pt-BR" dirty="0"/>
-              <a:t>visual hierarquia</a:t>
+              <a:t>Visual hierarquia</a:t>
             </a:r>
           </a:p>
         </p:txBody>
@@ -4276,7 +4274,7 @@
           <a:p>
             <a:r>
               <a:rPr lang="pt-BR" dirty="0" err="1"/>
-              <a:t>expectation</a:t>
+              <a:t>Expectation</a:t>
             </a:r>
             <a:r>
               <a:rPr lang="pt-BR" dirty="0"/>
@@ -4294,7 +4292,7 @@
           <a:p>
             <a:r>
               <a:rPr lang="pt-BR" dirty="0" err="1"/>
-              <a:t>tab</a:t>
+              <a:t>Tab</a:t>
             </a:r>
             <a:r>
               <a:rPr lang="pt-BR" dirty="0"/>
@@ -4309,7 +4307,7 @@
           <a:p>
             <a:r>
               <a:rPr lang="pt-BR" dirty="0" err="1"/>
-              <a:t>redising</a:t>
+              <a:t>Redising</a:t>
             </a:r>
             <a:r>
               <a:rPr lang="pt-BR" dirty="0"/>
@@ -4340,7 +4338,7 @@
           <a:p>
             <a:r>
               <a:rPr lang="pt-BR" dirty="0" err="1"/>
-              <a:t>simetry</a:t>
+              <a:t>Simetry</a:t>
             </a:r>
             <a:r>
               <a:rPr lang="pt-BR" dirty="0"/>
@@ -4363,7 +4361,7 @@
           <a:p>
             <a:r>
               <a:rPr lang="pt-BR" dirty="0" err="1"/>
-              <a:t>reference</a:t>
+              <a:t>Reference</a:t>
             </a:r>
             <a:r>
               <a:rPr lang="pt-BR" dirty="0"/>
@@ -4378,7 +4376,7 @@
           <a:p>
             <a:r>
               <a:rPr lang="pt-BR" dirty="0" err="1"/>
-              <a:t>less</a:t>
+              <a:t>Less</a:t>
             </a:r>
             <a:r>
               <a:rPr lang="pt-BR" dirty="0"/>
@@ -5183,7 +5181,7 @@
           <a:p>
             <a:r>
               <a:rPr lang="pt-BR" dirty="0" err="1"/>
-              <a:t>extraordinary</a:t>
+              <a:t>Extraordinary</a:t>
             </a:r>
             <a:r>
               <a:rPr lang="pt-BR" dirty="0"/>
@@ -5217,7 +5215,7 @@
           <a:p>
             <a:r>
               <a:rPr lang="pt-BR" dirty="0" err="1"/>
-              <a:t>dakr</a:t>
+              <a:t>Dark</a:t>
             </a:r>
             <a:r>
               <a:rPr lang="pt-BR" dirty="0"/>
@@ -5232,7 +5230,7 @@
           <a:p>
             <a:r>
               <a:rPr lang="pt-BR" dirty="0" err="1"/>
-              <a:t>vivid</a:t>
+              <a:t>Vivid</a:t>
             </a:r>
             <a:r>
               <a:rPr lang="pt-BR" dirty="0"/>
@@ -5339,7 +5337,7 @@
           <a:p>
             <a:r>
               <a:rPr lang="pt-BR" dirty="0"/>
-              <a:t>data </a:t>
+              <a:t>Data </a:t>
             </a:r>
             <a:r>
               <a:rPr lang="pt-BR" dirty="0" err="1"/>
@@ -5350,7 +5348,7 @@
           <a:p>
             <a:r>
               <a:rPr lang="pt-BR" dirty="0"/>
-              <a:t>inclusive design</a:t>
+              <a:t>Inclusive design</a:t>
             </a:r>
           </a:p>
           <a:p>
@@ -5458,7 +5456,7 @@
           <a:p>
             <a:r>
               <a:rPr lang="pt-BR" dirty="0" err="1"/>
-              <a:t>voice</a:t>
+              <a:t>Voice</a:t>
             </a:r>
             <a:r>
               <a:rPr lang="pt-BR" dirty="0"/>
@@ -5523,7 +5521,7 @@
           <a:p>
             <a:r>
               <a:rPr lang="pt-BR" dirty="0"/>
-              <a:t>personalize </a:t>
+              <a:t>Personalize </a:t>
             </a:r>
             <a:r>
               <a:rPr lang="pt-BR" dirty="0" err="1"/>
@@ -5542,7 +5540,7 @@
           <a:p>
             <a:r>
               <a:rPr lang="pt-BR" dirty="0"/>
-              <a:t>social </a:t>
+              <a:t>Social </a:t>
             </a:r>
             <a:r>
               <a:rPr lang="pt-BR" dirty="0" err="1"/>
@@ -5653,14 +5651,26 @@
           <a:lstStyle/>
           <a:p>
             <a:r>
-              <a:rPr lang="pt-BR" dirty="0"/>
-              <a:t>NEUMORPHISM IN USER INTERFACES</a:t>
-            </a:r>
-          </a:p>
-          <a:p>
-            <a:r>
-              <a:rPr lang="pt-BR" dirty="0" err="1"/>
-              <a:t>frosted</a:t>
+              <a:rPr lang="pt-BR" dirty="0" err="1"/>
+              <a:t>Neumorphism</a:t>
+            </a:r>
+            <a:r>
+              <a:rPr lang="pt-BR" dirty="0"/>
+              <a:t> in </a:t>
+            </a:r>
+            <a:r>
+              <a:rPr lang="pt-BR" dirty="0" err="1"/>
+              <a:t>user</a:t>
+            </a:r>
+            <a:r>
+              <a:rPr lang="pt-BR" dirty="0"/>
+              <a:t> interfaces</a:t>
+            </a:r>
+          </a:p>
+          <a:p>
+            <a:r>
+              <a:rPr lang="pt-BR" dirty="0" err="1"/>
+              <a:t>Frosted</a:t>
             </a:r>
             <a:r>
               <a:rPr lang="pt-BR" dirty="0"/>
@@ -5683,7 +5693,7 @@
           <a:p>
             <a:r>
               <a:rPr lang="pt-BR" dirty="0" err="1"/>
-              <a:t>confortable</a:t>
+              <a:t>Confortable</a:t>
             </a:r>
             <a:r>
               <a:rPr lang="pt-BR" dirty="0"/>
@@ -5698,7 +5708,7 @@
           <a:p>
             <a:r>
               <a:rPr lang="pt-BR" dirty="0"/>
-              <a:t>tridimensional </a:t>
+              <a:t>Tridimensional </a:t>
             </a:r>
             <a:r>
               <a:rPr lang="pt-BR" dirty="0" err="1"/>
@@ -5709,7 +5719,7 @@
           <a:p>
             <a:r>
               <a:rPr lang="pt-BR" dirty="0" err="1"/>
-              <a:t>gradient</a:t>
+              <a:t>Gradient</a:t>
             </a:r>
             <a:r>
               <a:rPr lang="pt-BR" dirty="0"/>
@@ -5819,7 +5829,7 @@
           <a:p>
             <a:r>
               <a:rPr lang="pt-BR" dirty="0" err="1"/>
-              <a:t>interactive</a:t>
+              <a:t>Interactive</a:t>
             </a:r>
             <a:r>
               <a:rPr lang="pt-BR" dirty="0"/>
@@ -5834,30 +5844,30 @@
           <a:p>
             <a:r>
               <a:rPr lang="pt-BR" dirty="0"/>
-              <a:t>material design</a:t>
-            </a:r>
-          </a:p>
-          <a:p>
-            <a:r>
-              <a:rPr lang="pt-BR" dirty="0" err="1"/>
-              <a:t>darkmode</a:t>
+              <a:t>Material design</a:t>
+            </a:r>
+          </a:p>
+          <a:p>
+            <a:r>
+              <a:rPr lang="pt-BR" dirty="0" err="1"/>
+              <a:t>Darkmode</a:t>
             </a:r>
             <a:endParaRPr lang="pt-BR" dirty="0"/>
           </a:p>
           <a:p>
             <a:r>
               <a:rPr lang="pt-BR" dirty="0" err="1"/>
-              <a:t>minimalist</a:t>
-            </a:r>
-            <a:r>
-              <a:rPr lang="pt-BR" dirty="0"/>
-              <a:t>(flat design)</a:t>
-            </a:r>
-          </a:p>
-          <a:p>
-            <a:r>
-              <a:rPr lang="pt-BR" dirty="0" err="1"/>
-              <a:t>hand</a:t>
+              <a:t>Minimalist</a:t>
+            </a:r>
+            <a:r>
+              <a:rPr lang="pt-BR" dirty="0"/>
+              <a:t> (flat design)</a:t>
+            </a:r>
+          </a:p>
+          <a:p>
+            <a:r>
+              <a:rPr lang="pt-BR" dirty="0" err="1"/>
+              <a:t>Hand</a:t>
             </a:r>
             <a:r>
               <a:rPr lang="pt-BR" dirty="0"/>
@@ -5965,7 +5975,7 @@
           <a:p>
             <a:r>
               <a:rPr lang="pt-BR" dirty="0" err="1"/>
-              <a:t>bold</a:t>
+              <a:t>Bold</a:t>
             </a:r>
             <a:r>
               <a:rPr lang="pt-BR" dirty="0"/>
@@ -5996,7 +6006,7 @@
           <a:p>
             <a:r>
               <a:rPr lang="pt-BR" dirty="0" err="1"/>
-              <a:t>blured</a:t>
+              <a:t>Blured</a:t>
             </a:r>
             <a:r>
               <a:rPr lang="pt-BR" dirty="0"/>
@@ -6027,7 +6037,7 @@
           <a:p>
             <a:r>
               <a:rPr lang="pt-BR" dirty="0" err="1"/>
-              <a:t>dark</a:t>
+              <a:t>Dark</a:t>
             </a:r>
             <a:r>
               <a:rPr lang="pt-BR" dirty="0"/>
@@ -6042,7 +6052,7 @@
           <a:p>
             <a:r>
               <a:rPr lang="pt-BR" dirty="0"/>
-              <a:t>3d </a:t>
+              <a:t>3D </a:t>
             </a:r>
             <a:r>
               <a:rPr lang="pt-BR" dirty="0" err="1"/>
@@ -6061,7 +6071,7 @@
           <a:p>
             <a:r>
               <a:rPr lang="pt-BR" dirty="0" err="1"/>
-              <a:t>nfts</a:t>
+              <a:t>Nfts</a:t>
             </a:r>
             <a:endParaRPr lang="pt-BR" dirty="0"/>
           </a:p>
@@ -6153,7 +6163,7 @@
           <a:p>
             <a:r>
               <a:rPr lang="pt-BR" dirty="0"/>
-              <a:t>retro </a:t>
+              <a:t>Retro </a:t>
             </a:r>
             <a:r>
               <a:rPr lang="pt-BR" dirty="0" err="1"/>
@@ -6175,7 +6185,7 @@
           <a:p>
             <a:r>
               <a:rPr lang="pt-BR" dirty="0"/>
-              <a:t>neon </a:t>
+              <a:t>Neon </a:t>
             </a:r>
             <a:r>
               <a:rPr lang="pt-BR" dirty="0" err="1"/>
@@ -6194,7 +6204,7 @@
           <a:p>
             <a:r>
               <a:rPr lang="pt-BR" dirty="0"/>
-              <a:t>abstract </a:t>
+              <a:t>Abstract </a:t>
             </a:r>
             <a:r>
               <a:rPr lang="pt-BR" dirty="0" err="1"/>
@@ -6205,7 +6215,7 @@
           <a:p>
             <a:r>
               <a:rPr lang="pt-BR" dirty="0" err="1"/>
-              <a:t>brutalism</a:t>
+              <a:t>Brutalism</a:t>
             </a:r>
             <a:endParaRPr lang="pt-BR" dirty="0"/>
           </a:p>

</xml_diff>